<commit_message>
all components partially completed
</commit_message>
<xml_diff>
--- a/documents/Screens.pptx
+++ b/documents/Screens.pptx
@@ -107,6 +107,11 @@
       </a:defRPr>
     </a:lvl9pPr>
   </p:defaultTextStyle>
+  <p:extLst>
+    <p:ext uri="{EFAFB233-063F-42B5-8137-9DF3F51BA10A}">
+      <p15:sldGuideLst xmlns:p15="http://schemas.microsoft.com/office/powerpoint/2012/main"/>
+    </p:ext>
+  </p:extLst>
 </p:presentation>
 </file>
 
@@ -155,7 +160,6 @@
               <a:rPr lang="en-US"/>
               <a:t>Click to edit Master title style</a:t>
             </a:r>
-            <a:endParaRPr lang="en-US"/>
           </a:p>
         </p:txBody>
       </p:sp>
@@ -220,7 +224,6 @@
               <a:rPr lang="en-US"/>
               <a:t>Click to edit Master subtitle style</a:t>
             </a:r>
-            <a:endParaRPr lang="en-US"/>
           </a:p>
         </p:txBody>
       </p:sp>
@@ -241,7 +244,7 @@
           <a:p>
             <a:fld id="{28591C49-E58E-4D90-B54F-2F4676D889BE}" type="datetimeFigureOut">
               <a:rPr lang="en-US" smtClean="0"/>
-              <a:t>01-Sep-20</a:t>
+              <a:t>02-Sep-20</a:t>
             </a:fld>
             <a:endParaRPr lang="en-US"/>
           </a:p>
@@ -338,7 +341,6 @@
               <a:rPr lang="en-US"/>
               <a:t>Click to edit Master title style</a:t>
             </a:r>
-            <a:endParaRPr lang="en-US"/>
           </a:p>
         </p:txBody>
       </p:sp>
@@ -390,7 +392,6 @@
               <a:rPr lang="en-US"/>
               <a:t>Fifth level</a:t>
             </a:r>
-            <a:endParaRPr lang="en-US"/>
           </a:p>
         </p:txBody>
       </p:sp>
@@ -411,7 +412,7 @@
           <a:p>
             <a:fld id="{28591C49-E58E-4D90-B54F-2F4676D889BE}" type="datetimeFigureOut">
               <a:rPr lang="en-US" smtClean="0"/>
-              <a:t>01-Sep-20</a:t>
+              <a:t>02-Sep-20</a:t>
             </a:fld>
             <a:endParaRPr lang="en-US"/>
           </a:p>
@@ -513,7 +514,6 @@
               <a:rPr lang="en-US"/>
               <a:t>Click to edit Master title style</a:t>
             </a:r>
-            <a:endParaRPr lang="en-US"/>
           </a:p>
         </p:txBody>
       </p:sp>
@@ -570,7 +570,6 @@
               <a:rPr lang="en-US"/>
               <a:t>Fifth level</a:t>
             </a:r>
-            <a:endParaRPr lang="en-US"/>
           </a:p>
         </p:txBody>
       </p:sp>
@@ -591,7 +590,7 @@
           <a:p>
             <a:fld id="{28591C49-E58E-4D90-B54F-2F4676D889BE}" type="datetimeFigureOut">
               <a:rPr lang="en-US" smtClean="0"/>
-              <a:t>01-Sep-20</a:t>
+              <a:t>02-Sep-20</a:t>
             </a:fld>
             <a:endParaRPr lang="en-US"/>
           </a:p>
@@ -688,7 +687,6 @@
               <a:rPr lang="en-US"/>
               <a:t>Click to edit Master title style</a:t>
             </a:r>
-            <a:endParaRPr lang="en-US"/>
           </a:p>
         </p:txBody>
       </p:sp>
@@ -740,7 +738,6 @@
               <a:rPr lang="en-US"/>
               <a:t>Fifth level</a:t>
             </a:r>
-            <a:endParaRPr lang="en-US"/>
           </a:p>
         </p:txBody>
       </p:sp>
@@ -761,7 +758,7 @@
           <a:p>
             <a:fld id="{28591C49-E58E-4D90-B54F-2F4676D889BE}" type="datetimeFigureOut">
               <a:rPr lang="en-US" smtClean="0"/>
-              <a:t>01-Sep-20</a:t>
+              <a:t>02-Sep-20</a:t>
             </a:fld>
             <a:endParaRPr lang="en-US"/>
           </a:p>
@@ -867,7 +864,6 @@
               <a:rPr lang="en-US"/>
               <a:t>Click to edit Master title style</a:t>
             </a:r>
-            <a:endParaRPr lang="en-US"/>
           </a:p>
         </p:txBody>
       </p:sp>
@@ -1007,7 +1003,7 @@
           <a:p>
             <a:fld id="{28591C49-E58E-4D90-B54F-2F4676D889BE}" type="datetimeFigureOut">
               <a:rPr lang="en-US" smtClean="0"/>
-              <a:t>01-Sep-20</a:t>
+              <a:t>02-Sep-20</a:t>
             </a:fld>
             <a:endParaRPr lang="en-US"/>
           </a:p>
@@ -1104,7 +1100,6 @@
               <a:rPr lang="en-US"/>
               <a:t>Click to edit Master title style</a:t>
             </a:r>
-            <a:endParaRPr lang="en-US"/>
           </a:p>
         </p:txBody>
       </p:sp>
@@ -1161,7 +1156,6 @@
               <a:rPr lang="en-US"/>
               <a:t>Fifth level</a:t>
             </a:r>
-            <a:endParaRPr lang="en-US"/>
           </a:p>
         </p:txBody>
       </p:sp>
@@ -1218,7 +1212,6 @@
               <a:rPr lang="en-US"/>
               <a:t>Fifth level</a:t>
             </a:r>
-            <a:endParaRPr lang="en-US"/>
           </a:p>
         </p:txBody>
       </p:sp>
@@ -1239,7 +1232,7 @@
           <a:p>
             <a:fld id="{28591C49-E58E-4D90-B54F-2F4676D889BE}" type="datetimeFigureOut">
               <a:rPr lang="en-US" smtClean="0"/>
-              <a:t>01-Sep-20</a:t>
+              <a:t>02-Sep-20</a:t>
             </a:fld>
             <a:endParaRPr lang="en-US"/>
           </a:p>
@@ -1341,7 +1334,6 @@
               <a:rPr lang="en-US"/>
               <a:t>Click to edit Master title style</a:t>
             </a:r>
-            <a:endParaRPr lang="en-US"/>
           </a:p>
         </p:txBody>
       </p:sp>
@@ -1463,7 +1455,6 @@
               <a:rPr lang="en-US"/>
               <a:t>Fifth level</a:t>
             </a:r>
-            <a:endParaRPr lang="en-US"/>
           </a:p>
         </p:txBody>
       </p:sp>
@@ -1585,7 +1576,6 @@
               <a:rPr lang="en-US"/>
               <a:t>Fifth level</a:t>
             </a:r>
-            <a:endParaRPr lang="en-US"/>
           </a:p>
         </p:txBody>
       </p:sp>
@@ -1606,7 +1596,7 @@
           <a:p>
             <a:fld id="{28591C49-E58E-4D90-B54F-2F4676D889BE}" type="datetimeFigureOut">
               <a:rPr lang="en-US" smtClean="0"/>
-              <a:t>01-Sep-20</a:t>
+              <a:t>02-Sep-20</a:t>
             </a:fld>
             <a:endParaRPr lang="en-US"/>
           </a:p>
@@ -1703,7 +1693,6 @@
               <a:rPr lang="en-US"/>
               <a:t>Click to edit Master title style</a:t>
             </a:r>
-            <a:endParaRPr lang="en-US"/>
           </a:p>
         </p:txBody>
       </p:sp>
@@ -1724,7 +1713,7 @@
           <a:p>
             <a:fld id="{28591C49-E58E-4D90-B54F-2F4676D889BE}" type="datetimeFigureOut">
               <a:rPr lang="en-US" smtClean="0"/>
-              <a:t>01-Sep-20</a:t>
+              <a:t>02-Sep-20</a:t>
             </a:fld>
             <a:endParaRPr lang="en-US"/>
           </a:p>
@@ -1819,7 +1808,7 @@
           <a:p>
             <a:fld id="{28591C49-E58E-4D90-B54F-2F4676D889BE}" type="datetimeFigureOut">
               <a:rPr lang="en-US" smtClean="0"/>
-              <a:t>01-Sep-20</a:t>
+              <a:t>02-Sep-20</a:t>
             </a:fld>
             <a:endParaRPr lang="en-US"/>
           </a:p>
@@ -1925,7 +1914,6 @@
               <a:rPr lang="en-US"/>
               <a:t>Click to edit Master title style</a:t>
             </a:r>
-            <a:endParaRPr lang="en-US"/>
           </a:p>
         </p:txBody>
       </p:sp>
@@ -2010,7 +1998,6 @@
               <a:rPr lang="en-US"/>
               <a:t>Fifth level</a:t>
             </a:r>
-            <a:endParaRPr lang="en-US"/>
           </a:p>
         </p:txBody>
       </p:sp>
@@ -2096,7 +2083,7 @@
           <a:p>
             <a:fld id="{28591C49-E58E-4D90-B54F-2F4676D889BE}" type="datetimeFigureOut">
               <a:rPr lang="en-US" smtClean="0"/>
-              <a:t>01-Sep-20</a:t>
+              <a:t>02-Sep-20</a:t>
             </a:fld>
             <a:endParaRPr lang="en-US"/>
           </a:p>
@@ -2202,7 +2189,6 @@
               <a:rPr lang="en-US"/>
               <a:t>Click to edit Master title style</a:t>
             </a:r>
-            <a:endParaRPr lang="en-US"/>
           </a:p>
         </p:txBody>
       </p:sp>
@@ -2349,7 +2335,7 @@
           <a:p>
             <a:fld id="{28591C49-E58E-4D90-B54F-2F4676D889BE}" type="datetimeFigureOut">
               <a:rPr lang="en-US" smtClean="0"/>
-              <a:t>01-Sep-20</a:t>
+              <a:t>02-Sep-20</a:t>
             </a:fld>
             <a:endParaRPr lang="en-US"/>
           </a:p>
@@ -2461,7 +2447,6 @@
               <a:rPr lang="en-US"/>
               <a:t>Click to edit Master title style</a:t>
             </a:r>
-            <a:endParaRPr lang="en-US"/>
           </a:p>
         </p:txBody>
       </p:sp>
@@ -2523,7 +2508,6 @@
               <a:rPr lang="en-US"/>
               <a:t>Fifth level</a:t>
             </a:r>
-            <a:endParaRPr lang="en-US"/>
           </a:p>
         </p:txBody>
       </p:sp>
@@ -2562,7 +2546,7 @@
           <a:p>
             <a:fld id="{28591C49-E58E-4D90-B54F-2F4676D889BE}" type="datetimeFigureOut">
               <a:rPr lang="en-US" smtClean="0"/>
-              <a:t>01-Sep-20</a:t>
+              <a:t>02-Sep-20</a:t>
             </a:fld>
             <a:endParaRPr lang="en-US"/>
           </a:p>

</xml_diff>